<commit_message>
Added powerpoint for deadlock detection
</commit_message>
<xml_diff>
--- a/DeadlockDetection_And/DeadlockDetectionAnd.pptx
+++ b/DeadlockDetection_And/DeadlockDetectionAnd.pptx
@@ -7,6 +7,12 @@
   <p:sldIdLst>
     <p:sldId id="257" r:id="rId2"/>
     <p:sldId id="258" r:id="rId3"/>
+    <p:sldId id="259" r:id="rId4"/>
+    <p:sldId id="261" r:id="rId5"/>
+    <p:sldId id="260" r:id="rId6"/>
+    <p:sldId id="262" r:id="rId7"/>
+    <p:sldId id="263" r:id="rId8"/>
+    <p:sldId id="264" r:id="rId9"/>
   </p:sldIdLst>
   <p:sldSz cx="9144000" cy="6858000" type="screen4x3"/>
   <p:notesSz cx="6858000" cy="9144000"/>
@@ -4811,6 +4817,2288 @@
     <p:extLst>
       <p:ext uri="{BB962C8B-B14F-4D97-AF65-F5344CB8AC3E}">
         <p14:creationId xmlns:p14="http://schemas.microsoft.com/office/powerpoint/2010/main" val="1256032430"/>
+      </p:ext>
+    </p:extLst>
+  </p:cSld>
+  <p:clrMapOvr>
+    <a:masterClrMapping/>
+  </p:clrMapOvr>
+</p:sld>
+</file>
+
+<file path=ppt/slides/slide3.xml><?xml version="1.0" encoding="utf-8"?>
+<p:sld xmlns:a="http://schemas.openxmlformats.org/drawingml/2006/main" xmlns:r="http://schemas.openxmlformats.org/officeDocument/2006/relationships" xmlns:p="http://schemas.openxmlformats.org/presentationml/2006/main">
+  <p:cSld>
+    <p:spTree>
+      <p:nvGrpSpPr>
+        <p:cNvPr id="1" name=""/>
+        <p:cNvGrpSpPr/>
+        <p:nvPr/>
+      </p:nvGrpSpPr>
+      <p:grpSpPr>
+        <a:xfrm>
+          <a:off x="0" y="0"/>
+          <a:ext cx="0" cy="0"/>
+          <a:chOff x="0" y="0"/>
+          <a:chExt cx="0" cy="0"/>
+        </a:xfrm>
+      </p:grpSpPr>
+      <p:sp>
+        <p:nvSpPr>
+          <p:cNvPr id="3" name="Oval 3"/>
+          <p:cNvSpPr>
+            <a:spLocks noChangeAspect="1" noChangeArrowheads="1"/>
+          </p:cNvSpPr>
+          <p:nvPr/>
+        </p:nvSpPr>
+        <p:spPr bwMode="auto">
+          <a:xfrm>
+            <a:off x="3427663" y="4025232"/>
+            <a:ext cx="1828800" cy="1828800"/>
+          </a:xfrm>
+          <a:prstGeom prst="ellipse">
+            <a:avLst/>
+          </a:prstGeom>
+          <a:noFill/>
+          <a:ln w="9525">
+            <a:solidFill>
+              <a:schemeClr val="tx1"/>
+            </a:solidFill>
+            <a:round/>
+            <a:headEnd/>
+            <a:tailEnd/>
+          </a:ln>
+          <a:extLst>
+            <a:ext uri="{909E8E84-426E-40dd-AFC4-6F175D3DCCD1}">
+              <a14:hiddenFill xmlns:a14="http://schemas.microsoft.com/office/drawing/2010/main">
+                <a:solidFill>
+                  <a:srgbClr val="FFFFFF"/>
+                </a:solidFill>
+              </a14:hiddenFill>
+            </a:ext>
+          </a:extLst>
+        </p:spPr>
+        <p:txBody>
+          <a:bodyPr wrap="none" anchor="ctr"/>
+          <a:lstStyle/>
+          <a:p>
+            <a:pPr algn="ctr"/>
+            <a:r>
+              <a:rPr lang="en-US" sz="2000" b="1" dirty="0" smtClean="0"/>
+              <a:t>X</a:t>
+            </a:r>
+          </a:p>
+          <a:p>
+            <a:pPr algn="ctr"/>
+            <a:r>
+              <a:rPr lang="en-US" sz="2000" b="1" dirty="0" smtClean="0"/>
+              <a:t>Holds red </a:t>
+            </a:r>
+          </a:p>
+          <a:p>
+            <a:pPr algn="ctr"/>
+            <a:r>
+              <a:rPr lang="en-US" sz="2000" b="1" dirty="0" smtClean="0"/>
+              <a:t>waiting for blue</a:t>
+            </a:r>
+            <a:endParaRPr lang="en-US" sz="2000" b="1" dirty="0"/>
+          </a:p>
+          <a:p>
+            <a:pPr algn="ctr"/>
+            <a:endParaRPr lang="en-US" sz="2000" b="1" dirty="0"/>
+          </a:p>
+        </p:txBody>
+      </p:sp>
+      <p:sp>
+        <p:nvSpPr>
+          <p:cNvPr id="6" name="Oval 5"/>
+          <p:cNvSpPr>
+            <a:spLocks noChangeAspect="1"/>
+          </p:cNvSpPr>
+          <p:nvPr/>
+        </p:nvSpPr>
+        <p:spPr>
+          <a:xfrm>
+            <a:off x="4114800" y="5293895"/>
+            <a:ext cx="457200" cy="457200"/>
+          </a:xfrm>
+          <a:prstGeom prst="ellipse">
+            <a:avLst/>
+          </a:prstGeom>
+          <a:solidFill>
+            <a:srgbClr val="FF0000"/>
+          </a:solidFill>
+        </p:spPr>
+        <p:style>
+          <a:lnRef idx="1">
+            <a:schemeClr val="accent1"/>
+          </a:lnRef>
+          <a:fillRef idx="3">
+            <a:schemeClr val="accent1"/>
+          </a:fillRef>
+          <a:effectRef idx="2">
+            <a:schemeClr val="accent1"/>
+          </a:effectRef>
+          <a:fontRef idx="minor">
+            <a:schemeClr val="lt1"/>
+          </a:fontRef>
+        </p:style>
+        <p:txBody>
+          <a:bodyPr rtlCol="0" anchor="ctr"/>
+          <a:lstStyle/>
+          <a:p>
+            <a:pPr algn="ctr"/>
+            <a:endParaRPr lang="en-US"/>
+          </a:p>
+        </p:txBody>
+      </p:sp>
+      <p:sp>
+        <p:nvSpPr>
+          <p:cNvPr id="18" name="TextBox 17"/>
+          <p:cNvSpPr txBox="1"/>
+          <p:nvPr/>
+        </p:nvSpPr>
+        <p:spPr>
+          <a:xfrm>
+            <a:off x="116055" y="6038562"/>
+            <a:ext cx="8384627" cy="584776"/>
+          </a:xfrm>
+          <a:prstGeom prst="rect">
+            <a:avLst/>
+          </a:prstGeom>
+          <a:solidFill>
+            <a:srgbClr val="FFFF00"/>
+          </a:solidFill>
+        </p:spPr>
+        <p:txBody>
+          <a:bodyPr wrap="none" rtlCol="0">
+            <a:spAutoFit/>
+          </a:bodyPr>
+          <a:lstStyle/>
+          <a:p>
+            <a:r>
+              <a:rPr lang="en-US" sz="3200" b="1" dirty="0" smtClean="0"/>
+              <a:t>Initiator x needs red and blue tokens. Holds red.</a:t>
+            </a:r>
+            <a:endParaRPr lang="en-US" sz="3200" b="1" dirty="0"/>
+          </a:p>
+        </p:txBody>
+      </p:sp>
+    </p:spTree>
+    <p:extLst>
+      <p:ext uri="{BB962C8B-B14F-4D97-AF65-F5344CB8AC3E}">
+        <p14:creationId xmlns:p14="http://schemas.microsoft.com/office/powerpoint/2010/main" val="2067934079"/>
+      </p:ext>
+    </p:extLst>
+  </p:cSld>
+  <p:clrMapOvr>
+    <a:masterClrMapping/>
+  </p:clrMapOvr>
+</p:sld>
+</file>
+
+<file path=ppt/slides/slide4.xml><?xml version="1.0" encoding="utf-8"?>
+<p:sld xmlns:a="http://schemas.openxmlformats.org/drawingml/2006/main" xmlns:r="http://schemas.openxmlformats.org/officeDocument/2006/relationships" xmlns:p="http://schemas.openxmlformats.org/presentationml/2006/main">
+  <p:cSld>
+    <p:spTree>
+      <p:nvGrpSpPr>
+        <p:cNvPr id="1" name=""/>
+        <p:cNvGrpSpPr/>
+        <p:nvPr/>
+      </p:nvGrpSpPr>
+      <p:grpSpPr>
+        <a:xfrm>
+          <a:off x="0" y="0"/>
+          <a:ext cx="0" cy="0"/>
+          <a:chOff x="0" y="0"/>
+          <a:chExt cx="0" cy="0"/>
+        </a:xfrm>
+      </p:grpSpPr>
+      <p:sp>
+        <p:nvSpPr>
+          <p:cNvPr id="3" name="Oval 3"/>
+          <p:cNvSpPr>
+            <a:spLocks noChangeAspect="1" noChangeArrowheads="1"/>
+          </p:cNvSpPr>
+          <p:nvPr/>
+        </p:nvSpPr>
+        <p:spPr bwMode="auto">
+          <a:xfrm>
+            <a:off x="3427663" y="4025232"/>
+            <a:ext cx="1828800" cy="1828800"/>
+          </a:xfrm>
+          <a:prstGeom prst="ellipse">
+            <a:avLst/>
+          </a:prstGeom>
+          <a:noFill/>
+          <a:ln w="9525">
+            <a:solidFill>
+              <a:schemeClr val="tx1"/>
+            </a:solidFill>
+            <a:round/>
+            <a:headEnd/>
+            <a:tailEnd/>
+          </a:ln>
+          <a:extLst>
+            <a:ext uri="{909E8E84-426E-40dd-AFC4-6F175D3DCCD1}">
+              <a14:hiddenFill xmlns:a14="http://schemas.microsoft.com/office/drawing/2010/main">
+                <a:solidFill>
+                  <a:srgbClr val="FFFFFF"/>
+                </a:solidFill>
+              </a14:hiddenFill>
+            </a:ext>
+          </a:extLst>
+        </p:spPr>
+        <p:txBody>
+          <a:bodyPr wrap="none" anchor="ctr"/>
+          <a:lstStyle/>
+          <a:p>
+            <a:pPr algn="ctr"/>
+            <a:r>
+              <a:rPr lang="en-US" sz="2000" b="1" dirty="0" smtClean="0"/>
+              <a:t>X</a:t>
+            </a:r>
+          </a:p>
+          <a:p>
+            <a:pPr algn="ctr"/>
+            <a:r>
+              <a:rPr lang="en-US" sz="2000" b="1" dirty="0" smtClean="0"/>
+              <a:t>Holds red </a:t>
+            </a:r>
+          </a:p>
+          <a:p>
+            <a:pPr algn="ctr"/>
+            <a:r>
+              <a:rPr lang="en-US" sz="2000" b="1" dirty="0" smtClean="0"/>
+              <a:t>waiting for blue</a:t>
+            </a:r>
+            <a:endParaRPr lang="en-US" sz="2000" b="1" dirty="0"/>
+          </a:p>
+          <a:p>
+            <a:pPr algn="ctr"/>
+            <a:endParaRPr lang="en-US" sz="2000" b="1" dirty="0"/>
+          </a:p>
+        </p:txBody>
+      </p:sp>
+      <p:sp>
+        <p:nvSpPr>
+          <p:cNvPr id="6" name="Oval 5"/>
+          <p:cNvSpPr>
+            <a:spLocks noChangeAspect="1"/>
+          </p:cNvSpPr>
+          <p:nvPr/>
+        </p:nvSpPr>
+        <p:spPr>
+          <a:xfrm>
+            <a:off x="4114800" y="5293895"/>
+            <a:ext cx="457200" cy="457200"/>
+          </a:xfrm>
+          <a:prstGeom prst="ellipse">
+            <a:avLst/>
+          </a:prstGeom>
+          <a:solidFill>
+            <a:srgbClr val="FF0000"/>
+          </a:solidFill>
+        </p:spPr>
+        <p:style>
+          <a:lnRef idx="1">
+            <a:schemeClr val="accent1"/>
+          </a:lnRef>
+          <a:fillRef idx="3">
+            <a:schemeClr val="accent1"/>
+          </a:fillRef>
+          <a:effectRef idx="2">
+            <a:schemeClr val="accent1"/>
+          </a:effectRef>
+          <a:fontRef idx="minor">
+            <a:schemeClr val="lt1"/>
+          </a:fontRef>
+        </p:style>
+        <p:txBody>
+          <a:bodyPr rtlCol="0" anchor="ctr"/>
+          <a:lstStyle/>
+          <a:p>
+            <a:pPr algn="ctr"/>
+            <a:endParaRPr lang="en-US"/>
+          </a:p>
+        </p:txBody>
+      </p:sp>
+      <p:cxnSp>
+        <p:nvCxnSpPr>
+          <p:cNvPr id="10" name="Straight Arrow Connector 9"/>
+          <p:cNvCxnSpPr>
+            <a:stCxn id="3" idx="7"/>
+          </p:cNvCxnSpPr>
+          <p:nvPr/>
+        </p:nvCxnSpPr>
+        <p:spPr>
+          <a:xfrm flipV="1">
+            <a:off x="4988641" y="4025232"/>
+            <a:ext cx="2380033" cy="267822"/>
+          </a:xfrm>
+          <a:prstGeom prst="straightConnector1">
+            <a:avLst/>
+          </a:prstGeom>
+          <a:ln>
+            <a:tailEnd type="arrow"/>
+          </a:ln>
+        </p:spPr>
+        <p:style>
+          <a:lnRef idx="2">
+            <a:schemeClr val="accent1"/>
+          </a:lnRef>
+          <a:fillRef idx="0">
+            <a:schemeClr val="accent1"/>
+          </a:fillRef>
+          <a:effectRef idx="1">
+            <a:schemeClr val="accent1"/>
+          </a:effectRef>
+          <a:fontRef idx="minor">
+            <a:schemeClr val="tx1"/>
+          </a:fontRef>
+        </p:style>
+      </p:cxnSp>
+      <p:sp>
+        <p:nvSpPr>
+          <p:cNvPr id="11" name="TextBox 10"/>
+          <p:cNvSpPr txBox="1"/>
+          <p:nvPr/>
+        </p:nvSpPr>
+        <p:spPr>
+          <a:xfrm>
+            <a:off x="5272695" y="4293054"/>
+            <a:ext cx="3763019" cy="461665"/>
+          </a:xfrm>
+          <a:prstGeom prst="rect">
+            <a:avLst/>
+          </a:prstGeom>
+          <a:noFill/>
+        </p:spPr>
+        <p:txBody>
+          <a:bodyPr wrap="none" rtlCol="0">
+            <a:spAutoFit/>
+          </a:bodyPr>
+          <a:lstStyle/>
+          <a:p>
+            <a:r>
+              <a:rPr lang="en-US" sz="2400" b="1" dirty="0" smtClean="0"/>
+              <a:t>Marker message: Need blue</a:t>
+            </a:r>
+            <a:endParaRPr lang="en-US" sz="2400" b="1" dirty="0"/>
+          </a:p>
+        </p:txBody>
+      </p:sp>
+      <p:sp>
+        <p:nvSpPr>
+          <p:cNvPr id="18" name="TextBox 17"/>
+          <p:cNvSpPr txBox="1"/>
+          <p:nvPr/>
+        </p:nvSpPr>
+        <p:spPr>
+          <a:xfrm>
+            <a:off x="116055" y="6038562"/>
+            <a:ext cx="6181901" cy="584776"/>
+          </a:xfrm>
+          <a:prstGeom prst="rect">
+            <a:avLst/>
+          </a:prstGeom>
+          <a:noFill/>
+        </p:spPr>
+        <p:txBody>
+          <a:bodyPr wrap="none" rtlCol="0">
+            <a:spAutoFit/>
+          </a:bodyPr>
+          <a:lstStyle/>
+          <a:p>
+            <a:r>
+              <a:rPr lang="en-US" sz="3200" b="1" dirty="0" smtClean="0"/>
+              <a:t>Initiator sends markers: Need blue!</a:t>
+            </a:r>
+            <a:endParaRPr lang="en-US" sz="3200" b="1" dirty="0"/>
+          </a:p>
+        </p:txBody>
+      </p:sp>
+    </p:spTree>
+    <p:extLst>
+      <p:ext uri="{BB962C8B-B14F-4D97-AF65-F5344CB8AC3E}">
+        <p14:creationId xmlns:p14="http://schemas.microsoft.com/office/powerpoint/2010/main" val="728218728"/>
+      </p:ext>
+    </p:extLst>
+  </p:cSld>
+  <p:clrMapOvr>
+    <a:masterClrMapping/>
+  </p:clrMapOvr>
+</p:sld>
+</file>
+
+<file path=ppt/slides/slide5.xml><?xml version="1.0" encoding="utf-8"?>
+<p:sld xmlns:a="http://schemas.openxmlformats.org/drawingml/2006/main" xmlns:r="http://schemas.openxmlformats.org/officeDocument/2006/relationships" xmlns:p="http://schemas.openxmlformats.org/presentationml/2006/main">
+  <p:cSld>
+    <p:spTree>
+      <p:nvGrpSpPr>
+        <p:cNvPr id="1" name=""/>
+        <p:cNvGrpSpPr/>
+        <p:nvPr/>
+      </p:nvGrpSpPr>
+      <p:grpSpPr>
+        <a:xfrm>
+          <a:off x="0" y="0"/>
+          <a:ext cx="0" cy="0"/>
+          <a:chOff x="0" y="0"/>
+          <a:chExt cx="0" cy="0"/>
+        </a:xfrm>
+      </p:grpSpPr>
+      <p:sp>
+        <p:nvSpPr>
+          <p:cNvPr id="3" name="Oval 3"/>
+          <p:cNvSpPr>
+            <a:spLocks noChangeAspect="1" noChangeArrowheads="1"/>
+          </p:cNvSpPr>
+          <p:nvPr/>
+        </p:nvSpPr>
+        <p:spPr bwMode="auto">
+          <a:xfrm>
+            <a:off x="3427663" y="4025232"/>
+            <a:ext cx="1828800" cy="1828800"/>
+          </a:xfrm>
+          <a:prstGeom prst="ellipse">
+            <a:avLst/>
+          </a:prstGeom>
+          <a:noFill/>
+          <a:ln w="9525">
+            <a:solidFill>
+              <a:schemeClr val="tx1"/>
+            </a:solidFill>
+            <a:round/>
+            <a:headEnd/>
+            <a:tailEnd/>
+          </a:ln>
+          <a:extLst>
+            <a:ext uri="{909E8E84-426E-40dd-AFC4-6F175D3DCCD1}">
+              <a14:hiddenFill xmlns:a14="http://schemas.microsoft.com/office/drawing/2010/main">
+                <a:solidFill>
+                  <a:srgbClr val="FFFFFF"/>
+                </a:solidFill>
+              </a14:hiddenFill>
+            </a:ext>
+          </a:extLst>
+        </p:spPr>
+        <p:txBody>
+          <a:bodyPr wrap="none" anchor="ctr"/>
+          <a:lstStyle/>
+          <a:p>
+            <a:pPr algn="ctr"/>
+            <a:r>
+              <a:rPr lang="en-US" sz="2000" b="1" dirty="0" smtClean="0"/>
+              <a:t>X</a:t>
+            </a:r>
+          </a:p>
+          <a:p>
+            <a:pPr algn="ctr"/>
+            <a:r>
+              <a:rPr lang="en-US" sz="2000" b="1" dirty="0" smtClean="0"/>
+              <a:t>Holds red </a:t>
+            </a:r>
+          </a:p>
+          <a:p>
+            <a:pPr algn="ctr"/>
+            <a:r>
+              <a:rPr lang="en-US" sz="2000" b="1" dirty="0" smtClean="0"/>
+              <a:t>waiting for blue</a:t>
+            </a:r>
+            <a:endParaRPr lang="en-US" sz="2000" b="1" dirty="0"/>
+          </a:p>
+          <a:p>
+            <a:pPr algn="ctr"/>
+            <a:endParaRPr lang="en-US" sz="2000" b="1" dirty="0"/>
+          </a:p>
+        </p:txBody>
+      </p:sp>
+      <p:sp>
+        <p:nvSpPr>
+          <p:cNvPr id="4" name="Oval 3"/>
+          <p:cNvSpPr>
+            <a:spLocks noChangeAspect="1" noChangeArrowheads="1"/>
+          </p:cNvSpPr>
+          <p:nvPr/>
+        </p:nvSpPr>
+        <p:spPr bwMode="auto">
+          <a:xfrm>
+            <a:off x="6614694" y="2196432"/>
+            <a:ext cx="1828800" cy="1828800"/>
+          </a:xfrm>
+          <a:prstGeom prst="ellipse">
+            <a:avLst/>
+          </a:prstGeom>
+          <a:noFill/>
+          <a:ln w="9525">
+            <a:solidFill>
+              <a:schemeClr val="tx1"/>
+            </a:solidFill>
+            <a:round/>
+            <a:headEnd/>
+            <a:tailEnd/>
+          </a:ln>
+          <a:extLst>
+            <a:ext uri="{909E8E84-426E-40dd-AFC4-6F175D3DCCD1}">
+              <a14:hiddenFill xmlns:a14="http://schemas.microsoft.com/office/drawing/2010/main">
+                <a:solidFill>
+                  <a:srgbClr val="FFFFFF"/>
+                </a:solidFill>
+              </a14:hiddenFill>
+            </a:ext>
+          </a:extLst>
+        </p:spPr>
+        <p:txBody>
+          <a:bodyPr wrap="none" anchor="ctr"/>
+          <a:lstStyle/>
+          <a:p>
+            <a:pPr algn="ctr"/>
+            <a:r>
+              <a:rPr lang="en-US" sz="2000" b="1" dirty="0"/>
+              <a:t>y</a:t>
+            </a:r>
+            <a:endParaRPr lang="en-US" sz="2000" b="1" dirty="0" smtClean="0"/>
+          </a:p>
+          <a:p>
+            <a:pPr algn="ctr"/>
+            <a:r>
+              <a:rPr lang="en-US" sz="2000" b="1" dirty="0" smtClean="0"/>
+              <a:t>Holds blue</a:t>
+            </a:r>
+          </a:p>
+          <a:p>
+            <a:pPr algn="ctr"/>
+            <a:r>
+              <a:rPr lang="en-US" sz="2000" b="1" dirty="0" smtClean="0"/>
+              <a:t>waiting for green</a:t>
+            </a:r>
+            <a:endParaRPr lang="en-US" sz="2000" b="1" dirty="0"/>
+          </a:p>
+          <a:p>
+            <a:pPr algn="ctr"/>
+            <a:endParaRPr lang="en-US" sz="2000" b="1" dirty="0"/>
+          </a:p>
+        </p:txBody>
+      </p:sp>
+      <p:sp>
+        <p:nvSpPr>
+          <p:cNvPr id="6" name="Oval 5"/>
+          <p:cNvSpPr>
+            <a:spLocks noChangeAspect="1"/>
+          </p:cNvSpPr>
+          <p:nvPr/>
+        </p:nvSpPr>
+        <p:spPr>
+          <a:xfrm>
+            <a:off x="4114800" y="5293895"/>
+            <a:ext cx="457200" cy="457200"/>
+          </a:xfrm>
+          <a:prstGeom prst="ellipse">
+            <a:avLst/>
+          </a:prstGeom>
+          <a:solidFill>
+            <a:srgbClr val="FF0000"/>
+          </a:solidFill>
+        </p:spPr>
+        <p:style>
+          <a:lnRef idx="1">
+            <a:schemeClr val="accent1"/>
+          </a:lnRef>
+          <a:fillRef idx="3">
+            <a:schemeClr val="accent1"/>
+          </a:fillRef>
+          <a:effectRef idx="2">
+            <a:schemeClr val="accent1"/>
+          </a:effectRef>
+          <a:fontRef idx="minor">
+            <a:schemeClr val="lt1"/>
+          </a:fontRef>
+        </p:style>
+        <p:txBody>
+          <a:bodyPr rtlCol="0" anchor="ctr"/>
+          <a:lstStyle/>
+          <a:p>
+            <a:pPr algn="ctr"/>
+            <a:endParaRPr lang="en-US"/>
+          </a:p>
+        </p:txBody>
+      </p:sp>
+      <p:sp>
+        <p:nvSpPr>
+          <p:cNvPr id="7" name="Oval 6"/>
+          <p:cNvSpPr>
+            <a:spLocks noChangeAspect="1"/>
+          </p:cNvSpPr>
+          <p:nvPr/>
+        </p:nvSpPr>
+        <p:spPr>
+          <a:xfrm>
+            <a:off x="7368674" y="3427663"/>
+            <a:ext cx="457200" cy="457200"/>
+          </a:xfrm>
+          <a:prstGeom prst="ellipse">
+            <a:avLst/>
+          </a:prstGeom>
+          <a:solidFill>
+            <a:srgbClr val="0000FF"/>
+          </a:solidFill>
+        </p:spPr>
+        <p:style>
+          <a:lnRef idx="1">
+            <a:schemeClr val="accent1"/>
+          </a:lnRef>
+          <a:fillRef idx="3">
+            <a:schemeClr val="accent1"/>
+          </a:fillRef>
+          <a:effectRef idx="2">
+            <a:schemeClr val="accent1"/>
+          </a:effectRef>
+          <a:fontRef idx="minor">
+            <a:schemeClr val="lt1"/>
+          </a:fontRef>
+        </p:style>
+        <p:txBody>
+          <a:bodyPr rtlCol="0" anchor="ctr"/>
+          <a:lstStyle/>
+          <a:p>
+            <a:pPr algn="ctr"/>
+            <a:endParaRPr lang="en-US"/>
+          </a:p>
+        </p:txBody>
+      </p:sp>
+      <p:cxnSp>
+        <p:nvCxnSpPr>
+          <p:cNvPr id="10" name="Straight Arrow Connector 9"/>
+          <p:cNvCxnSpPr>
+            <a:stCxn id="3" idx="7"/>
+          </p:cNvCxnSpPr>
+          <p:nvPr/>
+        </p:nvCxnSpPr>
+        <p:spPr>
+          <a:xfrm flipV="1">
+            <a:off x="4988641" y="4025232"/>
+            <a:ext cx="2380033" cy="267822"/>
+          </a:xfrm>
+          <a:prstGeom prst="straightConnector1">
+            <a:avLst/>
+          </a:prstGeom>
+          <a:ln>
+            <a:tailEnd type="arrow"/>
+          </a:ln>
+        </p:spPr>
+        <p:style>
+          <a:lnRef idx="2">
+            <a:schemeClr val="accent1"/>
+          </a:lnRef>
+          <a:fillRef idx="0">
+            <a:schemeClr val="accent1"/>
+          </a:fillRef>
+          <a:effectRef idx="1">
+            <a:schemeClr val="accent1"/>
+          </a:effectRef>
+          <a:fontRef idx="minor">
+            <a:schemeClr val="tx1"/>
+          </a:fontRef>
+        </p:style>
+      </p:cxnSp>
+      <p:sp>
+        <p:nvSpPr>
+          <p:cNvPr id="18" name="TextBox 17"/>
+          <p:cNvSpPr txBox="1"/>
+          <p:nvPr/>
+        </p:nvSpPr>
+        <p:spPr>
+          <a:xfrm>
+            <a:off x="116055" y="6038562"/>
+            <a:ext cx="7414009" cy="584776"/>
+          </a:xfrm>
+          <a:prstGeom prst="rect">
+            <a:avLst/>
+          </a:prstGeom>
+          <a:solidFill>
+            <a:srgbClr val="FFFFFF"/>
+          </a:solidFill>
+        </p:spPr>
+        <p:txBody>
+          <a:bodyPr wrap="none" rtlCol="0">
+            <a:spAutoFit/>
+          </a:bodyPr>
+          <a:lstStyle/>
+          <a:p>
+            <a:r>
+              <a:rPr lang="en-US" sz="3200" b="1" dirty="0" smtClean="0"/>
+              <a:t>Y needs blue and green tokens. Holds blue</a:t>
+            </a:r>
+            <a:endParaRPr lang="en-US" sz="3200" b="1" dirty="0"/>
+          </a:p>
+        </p:txBody>
+      </p:sp>
+      <p:sp>
+        <p:nvSpPr>
+          <p:cNvPr id="19" name="TextBox 18"/>
+          <p:cNvSpPr txBox="1"/>
+          <p:nvPr/>
+        </p:nvSpPr>
+        <p:spPr>
+          <a:xfrm>
+            <a:off x="5272695" y="4293054"/>
+            <a:ext cx="3763019" cy="461665"/>
+          </a:xfrm>
+          <a:prstGeom prst="rect">
+            <a:avLst/>
+          </a:prstGeom>
+          <a:noFill/>
+        </p:spPr>
+        <p:txBody>
+          <a:bodyPr wrap="none" rtlCol="0">
+            <a:spAutoFit/>
+          </a:bodyPr>
+          <a:lstStyle/>
+          <a:p>
+            <a:r>
+              <a:rPr lang="en-US" sz="2400" b="1" dirty="0" smtClean="0"/>
+              <a:t>Marker message: Need blue</a:t>
+            </a:r>
+            <a:endParaRPr lang="en-US" sz="2400" b="1" dirty="0"/>
+          </a:p>
+        </p:txBody>
+      </p:sp>
+    </p:spTree>
+    <p:extLst>
+      <p:ext uri="{BB962C8B-B14F-4D97-AF65-F5344CB8AC3E}">
+        <p14:creationId xmlns:p14="http://schemas.microsoft.com/office/powerpoint/2010/main" val="462633206"/>
+      </p:ext>
+    </p:extLst>
+  </p:cSld>
+  <p:clrMapOvr>
+    <a:masterClrMapping/>
+  </p:clrMapOvr>
+</p:sld>
+</file>
+
+<file path=ppt/slides/slide6.xml><?xml version="1.0" encoding="utf-8"?>
+<p:sld xmlns:a="http://schemas.openxmlformats.org/drawingml/2006/main" xmlns:r="http://schemas.openxmlformats.org/officeDocument/2006/relationships" xmlns:p="http://schemas.openxmlformats.org/presentationml/2006/main">
+  <p:cSld>
+    <p:spTree>
+      <p:nvGrpSpPr>
+        <p:cNvPr id="1" name=""/>
+        <p:cNvGrpSpPr/>
+        <p:nvPr/>
+      </p:nvGrpSpPr>
+      <p:grpSpPr>
+        <a:xfrm>
+          <a:off x="0" y="0"/>
+          <a:ext cx="0" cy="0"/>
+          <a:chOff x="0" y="0"/>
+          <a:chExt cx="0" cy="0"/>
+        </a:xfrm>
+      </p:grpSpPr>
+      <p:sp>
+        <p:nvSpPr>
+          <p:cNvPr id="3" name="Oval 3"/>
+          <p:cNvSpPr>
+            <a:spLocks noChangeAspect="1" noChangeArrowheads="1"/>
+          </p:cNvSpPr>
+          <p:nvPr/>
+        </p:nvSpPr>
+        <p:spPr bwMode="auto">
+          <a:xfrm>
+            <a:off x="3427663" y="4025232"/>
+            <a:ext cx="1828800" cy="1828800"/>
+          </a:xfrm>
+          <a:prstGeom prst="ellipse">
+            <a:avLst/>
+          </a:prstGeom>
+          <a:noFill/>
+          <a:ln w="9525">
+            <a:solidFill>
+              <a:schemeClr val="tx1"/>
+            </a:solidFill>
+            <a:round/>
+            <a:headEnd/>
+            <a:tailEnd/>
+          </a:ln>
+          <a:extLst>
+            <a:ext uri="{909E8E84-426E-40dd-AFC4-6F175D3DCCD1}">
+              <a14:hiddenFill xmlns:a14="http://schemas.microsoft.com/office/drawing/2010/main">
+                <a:solidFill>
+                  <a:srgbClr val="FFFFFF"/>
+                </a:solidFill>
+              </a14:hiddenFill>
+            </a:ext>
+          </a:extLst>
+        </p:spPr>
+        <p:txBody>
+          <a:bodyPr wrap="none" anchor="ctr"/>
+          <a:lstStyle/>
+          <a:p>
+            <a:pPr algn="ctr"/>
+            <a:r>
+              <a:rPr lang="en-US" sz="2000" b="1" dirty="0" smtClean="0"/>
+              <a:t>X</a:t>
+            </a:r>
+          </a:p>
+          <a:p>
+            <a:pPr algn="ctr"/>
+            <a:r>
+              <a:rPr lang="en-US" sz="2000" b="1" dirty="0" smtClean="0"/>
+              <a:t>Holds red </a:t>
+            </a:r>
+          </a:p>
+          <a:p>
+            <a:pPr algn="ctr"/>
+            <a:r>
+              <a:rPr lang="en-US" sz="2000" b="1" dirty="0" smtClean="0"/>
+              <a:t>waiting for blue</a:t>
+            </a:r>
+            <a:endParaRPr lang="en-US" sz="2000" b="1" dirty="0"/>
+          </a:p>
+          <a:p>
+            <a:pPr algn="ctr"/>
+            <a:endParaRPr lang="en-US" sz="2000" b="1" dirty="0"/>
+          </a:p>
+        </p:txBody>
+      </p:sp>
+      <p:sp>
+        <p:nvSpPr>
+          <p:cNvPr id="4" name="Oval 3"/>
+          <p:cNvSpPr>
+            <a:spLocks noChangeAspect="1" noChangeArrowheads="1"/>
+          </p:cNvSpPr>
+          <p:nvPr/>
+        </p:nvSpPr>
+        <p:spPr bwMode="auto">
+          <a:xfrm>
+            <a:off x="6614694" y="2196432"/>
+            <a:ext cx="1828800" cy="1828800"/>
+          </a:xfrm>
+          <a:prstGeom prst="ellipse">
+            <a:avLst/>
+          </a:prstGeom>
+          <a:noFill/>
+          <a:ln w="9525">
+            <a:solidFill>
+              <a:schemeClr val="tx1"/>
+            </a:solidFill>
+            <a:round/>
+            <a:headEnd/>
+            <a:tailEnd/>
+          </a:ln>
+          <a:extLst>
+            <a:ext uri="{909E8E84-426E-40dd-AFC4-6F175D3DCCD1}">
+              <a14:hiddenFill xmlns:a14="http://schemas.microsoft.com/office/drawing/2010/main">
+                <a:solidFill>
+                  <a:srgbClr val="FFFFFF"/>
+                </a:solidFill>
+              </a14:hiddenFill>
+            </a:ext>
+          </a:extLst>
+        </p:spPr>
+        <p:txBody>
+          <a:bodyPr wrap="none" anchor="ctr"/>
+          <a:lstStyle/>
+          <a:p>
+            <a:pPr algn="ctr"/>
+            <a:r>
+              <a:rPr lang="en-US" sz="2000" b="1" dirty="0"/>
+              <a:t>y</a:t>
+            </a:r>
+            <a:endParaRPr lang="en-US" sz="2000" b="1" dirty="0" smtClean="0"/>
+          </a:p>
+          <a:p>
+            <a:pPr algn="ctr"/>
+            <a:r>
+              <a:rPr lang="en-US" sz="2000" b="1" dirty="0" smtClean="0"/>
+              <a:t>Holds blue</a:t>
+            </a:r>
+          </a:p>
+          <a:p>
+            <a:pPr algn="ctr"/>
+            <a:r>
+              <a:rPr lang="en-US" sz="2000" b="1" dirty="0" smtClean="0"/>
+              <a:t>waiting for green</a:t>
+            </a:r>
+            <a:endParaRPr lang="en-US" sz="2000" b="1" dirty="0"/>
+          </a:p>
+          <a:p>
+            <a:pPr algn="ctr"/>
+            <a:endParaRPr lang="en-US" sz="2000" b="1" dirty="0"/>
+          </a:p>
+        </p:txBody>
+      </p:sp>
+      <p:sp>
+        <p:nvSpPr>
+          <p:cNvPr id="6" name="Oval 5"/>
+          <p:cNvSpPr>
+            <a:spLocks noChangeAspect="1"/>
+          </p:cNvSpPr>
+          <p:nvPr/>
+        </p:nvSpPr>
+        <p:spPr>
+          <a:xfrm>
+            <a:off x="4114800" y="5293895"/>
+            <a:ext cx="457200" cy="457200"/>
+          </a:xfrm>
+          <a:prstGeom prst="ellipse">
+            <a:avLst/>
+          </a:prstGeom>
+          <a:solidFill>
+            <a:srgbClr val="FF0000"/>
+          </a:solidFill>
+        </p:spPr>
+        <p:style>
+          <a:lnRef idx="1">
+            <a:schemeClr val="accent1"/>
+          </a:lnRef>
+          <a:fillRef idx="3">
+            <a:schemeClr val="accent1"/>
+          </a:fillRef>
+          <a:effectRef idx="2">
+            <a:schemeClr val="accent1"/>
+          </a:effectRef>
+          <a:fontRef idx="minor">
+            <a:schemeClr val="lt1"/>
+          </a:fontRef>
+        </p:style>
+        <p:txBody>
+          <a:bodyPr rtlCol="0" anchor="ctr"/>
+          <a:lstStyle/>
+          <a:p>
+            <a:pPr algn="ctr"/>
+            <a:endParaRPr lang="en-US"/>
+          </a:p>
+        </p:txBody>
+      </p:sp>
+      <p:sp>
+        <p:nvSpPr>
+          <p:cNvPr id="7" name="Oval 6"/>
+          <p:cNvSpPr>
+            <a:spLocks noChangeAspect="1"/>
+          </p:cNvSpPr>
+          <p:nvPr/>
+        </p:nvSpPr>
+        <p:spPr>
+          <a:xfrm>
+            <a:off x="7368674" y="3427663"/>
+            <a:ext cx="457200" cy="457200"/>
+          </a:xfrm>
+          <a:prstGeom prst="ellipse">
+            <a:avLst/>
+          </a:prstGeom>
+          <a:solidFill>
+            <a:srgbClr val="0000FF"/>
+          </a:solidFill>
+        </p:spPr>
+        <p:style>
+          <a:lnRef idx="1">
+            <a:schemeClr val="accent1"/>
+          </a:lnRef>
+          <a:fillRef idx="3">
+            <a:schemeClr val="accent1"/>
+          </a:fillRef>
+          <a:effectRef idx="2">
+            <a:schemeClr val="accent1"/>
+          </a:effectRef>
+          <a:fontRef idx="minor">
+            <a:schemeClr val="lt1"/>
+          </a:fontRef>
+        </p:style>
+        <p:txBody>
+          <a:bodyPr rtlCol="0" anchor="ctr"/>
+          <a:lstStyle/>
+          <a:p>
+            <a:pPr algn="ctr"/>
+            <a:endParaRPr lang="en-US"/>
+          </a:p>
+        </p:txBody>
+      </p:sp>
+      <p:cxnSp>
+        <p:nvCxnSpPr>
+          <p:cNvPr id="10" name="Straight Arrow Connector 9"/>
+          <p:cNvCxnSpPr>
+            <a:stCxn id="3" idx="7"/>
+          </p:cNvCxnSpPr>
+          <p:nvPr/>
+        </p:nvCxnSpPr>
+        <p:spPr>
+          <a:xfrm flipV="1">
+            <a:off x="4988641" y="4025232"/>
+            <a:ext cx="2380033" cy="267822"/>
+          </a:xfrm>
+          <a:prstGeom prst="straightConnector1">
+            <a:avLst/>
+          </a:prstGeom>
+          <a:ln>
+            <a:tailEnd type="arrow"/>
+          </a:ln>
+        </p:spPr>
+        <p:style>
+          <a:lnRef idx="2">
+            <a:schemeClr val="accent1"/>
+          </a:lnRef>
+          <a:fillRef idx="0">
+            <a:schemeClr val="accent1"/>
+          </a:fillRef>
+          <a:effectRef idx="1">
+            <a:schemeClr val="accent1"/>
+          </a:effectRef>
+          <a:fontRef idx="minor">
+            <a:schemeClr val="tx1"/>
+          </a:fontRef>
+        </p:style>
+      </p:cxnSp>
+      <p:cxnSp>
+        <p:nvCxnSpPr>
+          <p:cNvPr id="13" name="Straight Arrow Connector 12"/>
+          <p:cNvCxnSpPr>
+            <a:stCxn id="4" idx="1"/>
+          </p:cNvCxnSpPr>
+          <p:nvPr/>
+        </p:nvCxnSpPr>
+        <p:spPr>
+          <a:xfrm flipH="1" flipV="1">
+            <a:off x="4988641" y="1797599"/>
+            <a:ext cx="1893875" cy="666655"/>
+          </a:xfrm>
+          <a:prstGeom prst="straightConnector1">
+            <a:avLst/>
+          </a:prstGeom>
+          <a:ln>
+            <a:tailEnd type="arrow"/>
+          </a:ln>
+        </p:spPr>
+        <p:style>
+          <a:lnRef idx="2">
+            <a:schemeClr val="accent1"/>
+          </a:lnRef>
+          <a:fillRef idx="0">
+            <a:schemeClr val="accent1"/>
+          </a:fillRef>
+          <a:effectRef idx="1">
+            <a:schemeClr val="accent1"/>
+          </a:effectRef>
+          <a:fontRef idx="minor">
+            <a:schemeClr val="tx1"/>
+          </a:fontRef>
+        </p:style>
+      </p:cxnSp>
+      <p:sp>
+        <p:nvSpPr>
+          <p:cNvPr id="18" name="TextBox 17"/>
+          <p:cNvSpPr txBox="1"/>
+          <p:nvPr/>
+        </p:nvSpPr>
+        <p:spPr>
+          <a:xfrm>
+            <a:off x="116055" y="6038562"/>
+            <a:ext cx="5244344" cy="584776"/>
+          </a:xfrm>
+          <a:prstGeom prst="rect">
+            <a:avLst/>
+          </a:prstGeom>
+          <a:solidFill>
+            <a:srgbClr val="FFFFFF"/>
+          </a:solidFill>
+        </p:spPr>
+        <p:txBody>
+          <a:bodyPr wrap="none" rtlCol="0">
+            <a:spAutoFit/>
+          </a:bodyPr>
+          <a:lstStyle/>
+          <a:p>
+            <a:r>
+              <a:rPr lang="en-US" sz="3200" b="1" dirty="0"/>
+              <a:t>y</a:t>
+            </a:r>
+            <a:r>
+              <a:rPr lang="en-US" sz="3200" b="1" dirty="0" smtClean="0"/>
+              <a:t> sends markers: Need green!</a:t>
+            </a:r>
+            <a:endParaRPr lang="en-US" sz="3200" b="1" dirty="0"/>
+          </a:p>
+        </p:txBody>
+      </p:sp>
+      <p:sp>
+        <p:nvSpPr>
+          <p:cNvPr id="15" name="TextBox 14"/>
+          <p:cNvSpPr txBox="1"/>
+          <p:nvPr/>
+        </p:nvSpPr>
+        <p:spPr>
+          <a:xfrm>
+            <a:off x="5256463" y="1445876"/>
+            <a:ext cx="3932537" cy="461665"/>
+          </a:xfrm>
+          <a:prstGeom prst="rect">
+            <a:avLst/>
+          </a:prstGeom>
+          <a:noFill/>
+        </p:spPr>
+        <p:txBody>
+          <a:bodyPr wrap="none" rtlCol="0">
+            <a:spAutoFit/>
+          </a:bodyPr>
+          <a:lstStyle/>
+          <a:p>
+            <a:r>
+              <a:rPr lang="en-US" sz="2400" b="1" dirty="0" smtClean="0"/>
+              <a:t>Marker message: Need green</a:t>
+            </a:r>
+            <a:endParaRPr lang="en-US" sz="2400" b="1" dirty="0"/>
+          </a:p>
+        </p:txBody>
+      </p:sp>
+      <p:sp>
+        <p:nvSpPr>
+          <p:cNvPr id="12" name="TextBox 11"/>
+          <p:cNvSpPr txBox="1"/>
+          <p:nvPr/>
+        </p:nvSpPr>
+        <p:spPr>
+          <a:xfrm>
+            <a:off x="5272695" y="4293054"/>
+            <a:ext cx="3763019" cy="461665"/>
+          </a:xfrm>
+          <a:prstGeom prst="rect">
+            <a:avLst/>
+          </a:prstGeom>
+          <a:noFill/>
+        </p:spPr>
+        <p:txBody>
+          <a:bodyPr wrap="none" rtlCol="0">
+            <a:spAutoFit/>
+          </a:bodyPr>
+          <a:lstStyle/>
+          <a:p>
+            <a:r>
+              <a:rPr lang="en-US" sz="2400" b="1" dirty="0" smtClean="0"/>
+              <a:t>Marker message: Need blue</a:t>
+            </a:r>
+            <a:endParaRPr lang="en-US" sz="2400" b="1" dirty="0"/>
+          </a:p>
+        </p:txBody>
+      </p:sp>
+    </p:spTree>
+    <p:extLst>
+      <p:ext uri="{BB962C8B-B14F-4D97-AF65-F5344CB8AC3E}">
+        <p14:creationId xmlns:p14="http://schemas.microsoft.com/office/powerpoint/2010/main" val="410712568"/>
+      </p:ext>
+    </p:extLst>
+  </p:cSld>
+  <p:clrMapOvr>
+    <a:masterClrMapping/>
+  </p:clrMapOvr>
+</p:sld>
+</file>
+
+<file path=ppt/slides/slide7.xml><?xml version="1.0" encoding="utf-8"?>
+<p:sld xmlns:a="http://schemas.openxmlformats.org/drawingml/2006/main" xmlns:r="http://schemas.openxmlformats.org/officeDocument/2006/relationships" xmlns:p="http://schemas.openxmlformats.org/presentationml/2006/main">
+  <p:cSld>
+    <p:spTree>
+      <p:nvGrpSpPr>
+        <p:cNvPr id="1" name=""/>
+        <p:cNvGrpSpPr/>
+        <p:nvPr/>
+      </p:nvGrpSpPr>
+      <p:grpSpPr>
+        <a:xfrm>
+          <a:off x="0" y="0"/>
+          <a:ext cx="0" cy="0"/>
+          <a:chOff x="0" y="0"/>
+          <a:chExt cx="0" cy="0"/>
+        </a:xfrm>
+      </p:grpSpPr>
+      <p:sp>
+        <p:nvSpPr>
+          <p:cNvPr id="3" name="Oval 3"/>
+          <p:cNvSpPr>
+            <a:spLocks noChangeAspect="1" noChangeArrowheads="1"/>
+          </p:cNvSpPr>
+          <p:nvPr/>
+        </p:nvSpPr>
+        <p:spPr bwMode="auto">
+          <a:xfrm>
+            <a:off x="3427663" y="4025232"/>
+            <a:ext cx="1828800" cy="1828800"/>
+          </a:xfrm>
+          <a:prstGeom prst="ellipse">
+            <a:avLst/>
+          </a:prstGeom>
+          <a:noFill/>
+          <a:ln w="9525">
+            <a:solidFill>
+              <a:schemeClr val="tx1"/>
+            </a:solidFill>
+            <a:round/>
+            <a:headEnd/>
+            <a:tailEnd/>
+          </a:ln>
+          <a:extLst>
+            <a:ext uri="{909E8E84-426E-40dd-AFC4-6F175D3DCCD1}">
+              <a14:hiddenFill xmlns:a14="http://schemas.microsoft.com/office/drawing/2010/main">
+                <a:solidFill>
+                  <a:srgbClr val="FFFFFF"/>
+                </a:solidFill>
+              </a14:hiddenFill>
+            </a:ext>
+          </a:extLst>
+        </p:spPr>
+        <p:txBody>
+          <a:bodyPr wrap="none" anchor="ctr"/>
+          <a:lstStyle/>
+          <a:p>
+            <a:pPr algn="ctr"/>
+            <a:r>
+              <a:rPr lang="en-US" sz="2000" b="1" dirty="0" smtClean="0"/>
+              <a:t>X</a:t>
+            </a:r>
+          </a:p>
+          <a:p>
+            <a:pPr algn="ctr"/>
+            <a:r>
+              <a:rPr lang="en-US" sz="2000" b="1" dirty="0" smtClean="0"/>
+              <a:t>Holds red </a:t>
+            </a:r>
+          </a:p>
+          <a:p>
+            <a:pPr algn="ctr"/>
+            <a:r>
+              <a:rPr lang="en-US" sz="2000" b="1" dirty="0" smtClean="0"/>
+              <a:t>waiting for blue</a:t>
+            </a:r>
+            <a:endParaRPr lang="en-US" sz="2000" b="1" dirty="0"/>
+          </a:p>
+          <a:p>
+            <a:pPr algn="ctr"/>
+            <a:endParaRPr lang="en-US" sz="2000" b="1" dirty="0"/>
+          </a:p>
+        </p:txBody>
+      </p:sp>
+      <p:sp>
+        <p:nvSpPr>
+          <p:cNvPr id="4" name="Oval 3"/>
+          <p:cNvSpPr>
+            <a:spLocks noChangeAspect="1" noChangeArrowheads="1"/>
+          </p:cNvSpPr>
+          <p:nvPr/>
+        </p:nvSpPr>
+        <p:spPr bwMode="auto">
+          <a:xfrm>
+            <a:off x="6614694" y="2196432"/>
+            <a:ext cx="1828800" cy="1828800"/>
+          </a:xfrm>
+          <a:prstGeom prst="ellipse">
+            <a:avLst/>
+          </a:prstGeom>
+          <a:noFill/>
+          <a:ln w="9525">
+            <a:solidFill>
+              <a:schemeClr val="tx1"/>
+            </a:solidFill>
+            <a:round/>
+            <a:headEnd/>
+            <a:tailEnd/>
+          </a:ln>
+          <a:extLst>
+            <a:ext uri="{909E8E84-426E-40dd-AFC4-6F175D3DCCD1}">
+              <a14:hiddenFill xmlns:a14="http://schemas.microsoft.com/office/drawing/2010/main">
+                <a:solidFill>
+                  <a:srgbClr val="FFFFFF"/>
+                </a:solidFill>
+              </a14:hiddenFill>
+            </a:ext>
+          </a:extLst>
+        </p:spPr>
+        <p:txBody>
+          <a:bodyPr wrap="none" anchor="ctr"/>
+          <a:lstStyle/>
+          <a:p>
+            <a:pPr algn="ctr"/>
+            <a:r>
+              <a:rPr lang="en-US" sz="2000" b="1" dirty="0"/>
+              <a:t>y</a:t>
+            </a:r>
+            <a:endParaRPr lang="en-US" sz="2000" b="1" dirty="0" smtClean="0"/>
+          </a:p>
+          <a:p>
+            <a:pPr algn="ctr"/>
+            <a:r>
+              <a:rPr lang="en-US" sz="2000" b="1" dirty="0" smtClean="0"/>
+              <a:t>Holds blue</a:t>
+            </a:r>
+          </a:p>
+          <a:p>
+            <a:pPr algn="ctr"/>
+            <a:r>
+              <a:rPr lang="en-US" sz="2000" b="1" dirty="0" smtClean="0"/>
+              <a:t>waiting for green</a:t>
+            </a:r>
+            <a:endParaRPr lang="en-US" sz="2000" b="1" dirty="0"/>
+          </a:p>
+          <a:p>
+            <a:pPr algn="ctr"/>
+            <a:endParaRPr lang="en-US" sz="2000" b="1" dirty="0"/>
+          </a:p>
+        </p:txBody>
+      </p:sp>
+      <p:sp>
+        <p:nvSpPr>
+          <p:cNvPr id="5" name="Oval 4"/>
+          <p:cNvSpPr>
+            <a:spLocks noChangeAspect="1" noChangeArrowheads="1"/>
+          </p:cNvSpPr>
+          <p:nvPr/>
+        </p:nvSpPr>
+        <p:spPr bwMode="auto">
+          <a:xfrm>
+            <a:off x="3427663" y="236621"/>
+            <a:ext cx="1828800" cy="1828800"/>
+          </a:xfrm>
+          <a:prstGeom prst="ellipse">
+            <a:avLst/>
+          </a:prstGeom>
+          <a:noFill/>
+          <a:ln w="9525">
+            <a:solidFill>
+              <a:schemeClr val="tx1"/>
+            </a:solidFill>
+            <a:round/>
+            <a:headEnd/>
+            <a:tailEnd/>
+          </a:ln>
+          <a:extLst>
+            <a:ext uri="{909E8E84-426E-40dd-AFC4-6F175D3DCCD1}">
+              <a14:hiddenFill xmlns:a14="http://schemas.microsoft.com/office/drawing/2010/main">
+                <a:solidFill>
+                  <a:srgbClr val="FFFFFF"/>
+                </a:solidFill>
+              </a14:hiddenFill>
+            </a:ext>
+          </a:extLst>
+        </p:spPr>
+        <p:txBody>
+          <a:bodyPr wrap="none" anchor="ctr"/>
+          <a:lstStyle/>
+          <a:p>
+            <a:pPr algn="ctr"/>
+            <a:r>
+              <a:rPr lang="en-US" sz="2000" b="1" dirty="0" smtClean="0"/>
+              <a:t>z</a:t>
+            </a:r>
+          </a:p>
+          <a:p>
+            <a:pPr algn="ctr"/>
+            <a:r>
+              <a:rPr lang="en-US" sz="2000" b="1" dirty="0" smtClean="0"/>
+              <a:t>Holds green</a:t>
+            </a:r>
+          </a:p>
+          <a:p>
+            <a:pPr algn="ctr"/>
+            <a:r>
+              <a:rPr lang="en-US" sz="2000" b="1" dirty="0" smtClean="0"/>
+              <a:t>waiting for red</a:t>
+            </a:r>
+            <a:endParaRPr lang="en-US" sz="2000" b="1" dirty="0"/>
+          </a:p>
+          <a:p>
+            <a:pPr algn="ctr"/>
+            <a:endParaRPr lang="en-US" sz="2000" b="1" dirty="0"/>
+          </a:p>
+        </p:txBody>
+      </p:sp>
+      <p:sp>
+        <p:nvSpPr>
+          <p:cNvPr id="6" name="Oval 5"/>
+          <p:cNvSpPr>
+            <a:spLocks noChangeAspect="1"/>
+          </p:cNvSpPr>
+          <p:nvPr/>
+        </p:nvSpPr>
+        <p:spPr>
+          <a:xfrm>
+            <a:off x="4114800" y="5293895"/>
+            <a:ext cx="457200" cy="457200"/>
+          </a:xfrm>
+          <a:prstGeom prst="ellipse">
+            <a:avLst/>
+          </a:prstGeom>
+          <a:solidFill>
+            <a:srgbClr val="FF0000"/>
+          </a:solidFill>
+        </p:spPr>
+        <p:style>
+          <a:lnRef idx="1">
+            <a:schemeClr val="accent1"/>
+          </a:lnRef>
+          <a:fillRef idx="3">
+            <a:schemeClr val="accent1"/>
+          </a:fillRef>
+          <a:effectRef idx="2">
+            <a:schemeClr val="accent1"/>
+          </a:effectRef>
+          <a:fontRef idx="minor">
+            <a:schemeClr val="lt1"/>
+          </a:fontRef>
+        </p:style>
+        <p:txBody>
+          <a:bodyPr rtlCol="0" anchor="ctr"/>
+          <a:lstStyle/>
+          <a:p>
+            <a:pPr algn="ctr"/>
+            <a:endParaRPr lang="en-US"/>
+          </a:p>
+        </p:txBody>
+      </p:sp>
+      <p:sp>
+        <p:nvSpPr>
+          <p:cNvPr id="7" name="Oval 6"/>
+          <p:cNvSpPr>
+            <a:spLocks noChangeAspect="1"/>
+          </p:cNvSpPr>
+          <p:nvPr/>
+        </p:nvSpPr>
+        <p:spPr>
+          <a:xfrm>
+            <a:off x="7368674" y="3427663"/>
+            <a:ext cx="457200" cy="457200"/>
+          </a:xfrm>
+          <a:prstGeom prst="ellipse">
+            <a:avLst/>
+          </a:prstGeom>
+          <a:solidFill>
+            <a:srgbClr val="0000FF"/>
+          </a:solidFill>
+        </p:spPr>
+        <p:style>
+          <a:lnRef idx="1">
+            <a:schemeClr val="accent1"/>
+          </a:lnRef>
+          <a:fillRef idx="3">
+            <a:schemeClr val="accent1"/>
+          </a:fillRef>
+          <a:effectRef idx="2">
+            <a:schemeClr val="accent1"/>
+          </a:effectRef>
+          <a:fontRef idx="minor">
+            <a:schemeClr val="lt1"/>
+          </a:fontRef>
+        </p:style>
+        <p:txBody>
+          <a:bodyPr rtlCol="0" anchor="ctr"/>
+          <a:lstStyle/>
+          <a:p>
+            <a:pPr algn="ctr"/>
+            <a:endParaRPr lang="en-US"/>
+          </a:p>
+        </p:txBody>
+      </p:sp>
+      <p:sp>
+        <p:nvSpPr>
+          <p:cNvPr id="8" name="Oval 7"/>
+          <p:cNvSpPr>
+            <a:spLocks noChangeAspect="1"/>
+          </p:cNvSpPr>
+          <p:nvPr/>
+        </p:nvSpPr>
+        <p:spPr>
+          <a:xfrm>
+            <a:off x="4114800" y="1494589"/>
+            <a:ext cx="457200" cy="457200"/>
+          </a:xfrm>
+          <a:prstGeom prst="ellipse">
+            <a:avLst/>
+          </a:prstGeom>
+          <a:solidFill>
+            <a:srgbClr val="008000"/>
+          </a:solidFill>
+        </p:spPr>
+        <p:style>
+          <a:lnRef idx="1">
+            <a:schemeClr val="accent1"/>
+          </a:lnRef>
+          <a:fillRef idx="3">
+            <a:schemeClr val="accent1"/>
+          </a:fillRef>
+          <a:effectRef idx="2">
+            <a:schemeClr val="accent1"/>
+          </a:effectRef>
+          <a:fontRef idx="minor">
+            <a:schemeClr val="lt1"/>
+          </a:fontRef>
+        </p:style>
+        <p:txBody>
+          <a:bodyPr rtlCol="0" anchor="ctr"/>
+          <a:lstStyle/>
+          <a:p>
+            <a:pPr algn="ctr"/>
+            <a:endParaRPr lang="en-US"/>
+          </a:p>
+        </p:txBody>
+      </p:sp>
+      <p:cxnSp>
+        <p:nvCxnSpPr>
+          <p:cNvPr id="10" name="Straight Arrow Connector 9"/>
+          <p:cNvCxnSpPr>
+            <a:stCxn id="3" idx="7"/>
+          </p:cNvCxnSpPr>
+          <p:nvPr/>
+        </p:nvCxnSpPr>
+        <p:spPr>
+          <a:xfrm flipV="1">
+            <a:off x="4988641" y="4025232"/>
+            <a:ext cx="2380033" cy="267822"/>
+          </a:xfrm>
+          <a:prstGeom prst="straightConnector1">
+            <a:avLst/>
+          </a:prstGeom>
+          <a:ln>
+            <a:tailEnd type="arrow"/>
+          </a:ln>
+        </p:spPr>
+        <p:style>
+          <a:lnRef idx="2">
+            <a:schemeClr val="accent1"/>
+          </a:lnRef>
+          <a:fillRef idx="0">
+            <a:schemeClr val="accent1"/>
+          </a:fillRef>
+          <a:effectRef idx="1">
+            <a:schemeClr val="accent1"/>
+          </a:effectRef>
+          <a:fontRef idx="minor">
+            <a:schemeClr val="tx1"/>
+          </a:fontRef>
+        </p:style>
+      </p:cxnSp>
+      <p:cxnSp>
+        <p:nvCxnSpPr>
+          <p:cNvPr id="13" name="Straight Arrow Connector 12"/>
+          <p:cNvCxnSpPr>
+            <a:stCxn id="4" idx="1"/>
+            <a:endCxn id="5" idx="5"/>
+          </p:cNvCxnSpPr>
+          <p:nvPr/>
+        </p:nvCxnSpPr>
+        <p:spPr>
+          <a:xfrm flipH="1" flipV="1">
+            <a:off x="4988641" y="1797599"/>
+            <a:ext cx="1893875" cy="666655"/>
+          </a:xfrm>
+          <a:prstGeom prst="straightConnector1">
+            <a:avLst/>
+          </a:prstGeom>
+          <a:ln>
+            <a:tailEnd type="arrow"/>
+          </a:ln>
+        </p:spPr>
+        <p:style>
+          <a:lnRef idx="2">
+            <a:schemeClr val="accent1"/>
+          </a:lnRef>
+          <a:fillRef idx="0">
+            <a:schemeClr val="accent1"/>
+          </a:fillRef>
+          <a:effectRef idx="1">
+            <a:schemeClr val="accent1"/>
+          </a:effectRef>
+          <a:fontRef idx="minor">
+            <a:schemeClr val="tx1"/>
+          </a:fontRef>
+        </p:style>
+      </p:cxnSp>
+      <p:sp>
+        <p:nvSpPr>
+          <p:cNvPr id="15" name="TextBox 14"/>
+          <p:cNvSpPr txBox="1"/>
+          <p:nvPr/>
+        </p:nvSpPr>
+        <p:spPr>
+          <a:xfrm>
+            <a:off x="5256463" y="1445876"/>
+            <a:ext cx="3932537" cy="461665"/>
+          </a:xfrm>
+          <a:prstGeom prst="rect">
+            <a:avLst/>
+          </a:prstGeom>
+          <a:noFill/>
+        </p:spPr>
+        <p:txBody>
+          <a:bodyPr wrap="none" rtlCol="0">
+            <a:spAutoFit/>
+          </a:bodyPr>
+          <a:lstStyle/>
+          <a:p>
+            <a:r>
+              <a:rPr lang="en-US" sz="2400" b="1" dirty="0" smtClean="0"/>
+              <a:t>Marker message: Need green</a:t>
+            </a:r>
+            <a:endParaRPr lang="en-US" sz="2400" b="1" dirty="0"/>
+          </a:p>
+        </p:txBody>
+      </p:sp>
+      <p:sp>
+        <p:nvSpPr>
+          <p:cNvPr id="19" name="TextBox 18"/>
+          <p:cNvSpPr txBox="1"/>
+          <p:nvPr/>
+        </p:nvSpPr>
+        <p:spPr>
+          <a:xfrm>
+            <a:off x="5272695" y="4293054"/>
+            <a:ext cx="3763019" cy="461665"/>
+          </a:xfrm>
+          <a:prstGeom prst="rect">
+            <a:avLst/>
+          </a:prstGeom>
+          <a:noFill/>
+        </p:spPr>
+        <p:txBody>
+          <a:bodyPr wrap="none" rtlCol="0">
+            <a:spAutoFit/>
+          </a:bodyPr>
+          <a:lstStyle/>
+          <a:p>
+            <a:r>
+              <a:rPr lang="en-US" sz="2400" b="1" dirty="0" smtClean="0"/>
+              <a:t>Marker message: Need blue</a:t>
+            </a:r>
+            <a:endParaRPr lang="en-US" sz="2400" b="1" dirty="0"/>
+          </a:p>
+        </p:txBody>
+      </p:sp>
+      <p:sp>
+        <p:nvSpPr>
+          <p:cNvPr id="20" name="TextBox 19"/>
+          <p:cNvSpPr txBox="1"/>
+          <p:nvPr/>
+        </p:nvSpPr>
+        <p:spPr>
+          <a:xfrm>
+            <a:off x="116055" y="6038562"/>
+            <a:ext cx="7511591" cy="584776"/>
+          </a:xfrm>
+          <a:prstGeom prst="rect">
+            <a:avLst/>
+          </a:prstGeom>
+          <a:solidFill>
+            <a:srgbClr val="FFFFFF"/>
+          </a:solidFill>
+        </p:spPr>
+        <p:txBody>
+          <a:bodyPr wrap="none" rtlCol="0">
+            <a:spAutoFit/>
+          </a:bodyPr>
+          <a:lstStyle/>
+          <a:p>
+            <a:r>
+              <a:rPr lang="en-US" sz="3200" b="1" dirty="0"/>
+              <a:t>z</a:t>
+            </a:r>
+            <a:r>
+              <a:rPr lang="en-US" sz="3200" b="1" dirty="0" smtClean="0"/>
+              <a:t> needs green and red tokens. Holds green.</a:t>
+            </a:r>
+            <a:endParaRPr lang="en-US" sz="3200" b="1" dirty="0"/>
+          </a:p>
+        </p:txBody>
+      </p:sp>
+    </p:spTree>
+    <p:extLst>
+      <p:ext uri="{BB962C8B-B14F-4D97-AF65-F5344CB8AC3E}">
+        <p14:creationId xmlns:p14="http://schemas.microsoft.com/office/powerpoint/2010/main" val="2730809802"/>
+      </p:ext>
+    </p:extLst>
+  </p:cSld>
+  <p:clrMapOvr>
+    <a:masterClrMapping/>
+  </p:clrMapOvr>
+</p:sld>
+</file>
+
+<file path=ppt/slides/slide8.xml><?xml version="1.0" encoding="utf-8"?>
+<p:sld xmlns:a="http://schemas.openxmlformats.org/drawingml/2006/main" xmlns:r="http://schemas.openxmlformats.org/officeDocument/2006/relationships" xmlns:p="http://schemas.openxmlformats.org/presentationml/2006/main">
+  <p:cSld>
+    <p:spTree>
+      <p:nvGrpSpPr>
+        <p:cNvPr id="1" name=""/>
+        <p:cNvGrpSpPr/>
+        <p:nvPr/>
+      </p:nvGrpSpPr>
+      <p:grpSpPr>
+        <a:xfrm>
+          <a:off x="0" y="0"/>
+          <a:ext cx="0" cy="0"/>
+          <a:chOff x="0" y="0"/>
+          <a:chExt cx="0" cy="0"/>
+        </a:xfrm>
+      </p:grpSpPr>
+      <p:sp>
+        <p:nvSpPr>
+          <p:cNvPr id="3" name="Oval 3"/>
+          <p:cNvSpPr>
+            <a:spLocks noChangeAspect="1" noChangeArrowheads="1"/>
+          </p:cNvSpPr>
+          <p:nvPr/>
+        </p:nvSpPr>
+        <p:spPr bwMode="auto">
+          <a:xfrm>
+            <a:off x="3427663" y="4025232"/>
+            <a:ext cx="1828800" cy="1828800"/>
+          </a:xfrm>
+          <a:prstGeom prst="ellipse">
+            <a:avLst/>
+          </a:prstGeom>
+          <a:noFill/>
+          <a:ln w="9525">
+            <a:solidFill>
+              <a:schemeClr val="tx1"/>
+            </a:solidFill>
+            <a:round/>
+            <a:headEnd/>
+            <a:tailEnd/>
+          </a:ln>
+          <a:extLst>
+            <a:ext uri="{909E8E84-426E-40dd-AFC4-6F175D3DCCD1}">
+              <a14:hiddenFill xmlns:a14="http://schemas.microsoft.com/office/drawing/2010/main">
+                <a:solidFill>
+                  <a:srgbClr val="FFFFFF"/>
+                </a:solidFill>
+              </a14:hiddenFill>
+            </a:ext>
+          </a:extLst>
+        </p:spPr>
+        <p:txBody>
+          <a:bodyPr wrap="none" anchor="ctr"/>
+          <a:lstStyle/>
+          <a:p>
+            <a:pPr algn="ctr"/>
+            <a:r>
+              <a:rPr lang="en-US" sz="2000" b="1" dirty="0" smtClean="0"/>
+              <a:t>X</a:t>
+            </a:r>
+          </a:p>
+          <a:p>
+            <a:pPr algn="ctr"/>
+            <a:r>
+              <a:rPr lang="en-US" sz="2000" b="1" dirty="0" smtClean="0"/>
+              <a:t>Holds red </a:t>
+            </a:r>
+          </a:p>
+          <a:p>
+            <a:pPr algn="ctr"/>
+            <a:r>
+              <a:rPr lang="en-US" sz="2000" b="1" dirty="0" smtClean="0"/>
+              <a:t>waiting for blue</a:t>
+            </a:r>
+            <a:endParaRPr lang="en-US" sz="2000" b="1" dirty="0"/>
+          </a:p>
+          <a:p>
+            <a:pPr algn="ctr"/>
+            <a:endParaRPr lang="en-US" sz="2000" b="1" dirty="0"/>
+          </a:p>
+        </p:txBody>
+      </p:sp>
+      <p:sp>
+        <p:nvSpPr>
+          <p:cNvPr id="4" name="Oval 3"/>
+          <p:cNvSpPr>
+            <a:spLocks noChangeAspect="1" noChangeArrowheads="1"/>
+          </p:cNvSpPr>
+          <p:nvPr/>
+        </p:nvSpPr>
+        <p:spPr bwMode="auto">
+          <a:xfrm>
+            <a:off x="6614694" y="2196432"/>
+            <a:ext cx="1828800" cy="1828800"/>
+          </a:xfrm>
+          <a:prstGeom prst="ellipse">
+            <a:avLst/>
+          </a:prstGeom>
+          <a:noFill/>
+          <a:ln w="9525">
+            <a:solidFill>
+              <a:schemeClr val="tx1"/>
+            </a:solidFill>
+            <a:round/>
+            <a:headEnd/>
+            <a:tailEnd/>
+          </a:ln>
+          <a:extLst>
+            <a:ext uri="{909E8E84-426E-40dd-AFC4-6F175D3DCCD1}">
+              <a14:hiddenFill xmlns:a14="http://schemas.microsoft.com/office/drawing/2010/main">
+                <a:solidFill>
+                  <a:srgbClr val="FFFFFF"/>
+                </a:solidFill>
+              </a14:hiddenFill>
+            </a:ext>
+          </a:extLst>
+        </p:spPr>
+        <p:txBody>
+          <a:bodyPr wrap="none" anchor="ctr"/>
+          <a:lstStyle/>
+          <a:p>
+            <a:pPr algn="ctr"/>
+            <a:r>
+              <a:rPr lang="en-US" sz="2000" b="1" dirty="0"/>
+              <a:t>y</a:t>
+            </a:r>
+            <a:endParaRPr lang="en-US" sz="2000" b="1" dirty="0" smtClean="0"/>
+          </a:p>
+          <a:p>
+            <a:pPr algn="ctr"/>
+            <a:r>
+              <a:rPr lang="en-US" sz="2000" b="1" dirty="0" smtClean="0"/>
+              <a:t>Holds blue</a:t>
+            </a:r>
+          </a:p>
+          <a:p>
+            <a:pPr algn="ctr"/>
+            <a:r>
+              <a:rPr lang="en-US" sz="2000" b="1" dirty="0" smtClean="0"/>
+              <a:t>waiting for green</a:t>
+            </a:r>
+            <a:endParaRPr lang="en-US" sz="2000" b="1" dirty="0"/>
+          </a:p>
+          <a:p>
+            <a:pPr algn="ctr"/>
+            <a:endParaRPr lang="en-US" sz="2000" b="1" dirty="0"/>
+          </a:p>
+        </p:txBody>
+      </p:sp>
+      <p:sp>
+        <p:nvSpPr>
+          <p:cNvPr id="5" name="Oval 4"/>
+          <p:cNvSpPr>
+            <a:spLocks noChangeAspect="1" noChangeArrowheads="1"/>
+          </p:cNvSpPr>
+          <p:nvPr/>
+        </p:nvSpPr>
+        <p:spPr bwMode="auto">
+          <a:xfrm>
+            <a:off x="3427663" y="236621"/>
+            <a:ext cx="1828800" cy="1828800"/>
+          </a:xfrm>
+          <a:prstGeom prst="ellipse">
+            <a:avLst/>
+          </a:prstGeom>
+          <a:noFill/>
+          <a:ln w="9525">
+            <a:solidFill>
+              <a:schemeClr val="tx1"/>
+            </a:solidFill>
+            <a:round/>
+            <a:headEnd/>
+            <a:tailEnd/>
+          </a:ln>
+          <a:extLst>
+            <a:ext uri="{909E8E84-426E-40dd-AFC4-6F175D3DCCD1}">
+              <a14:hiddenFill xmlns:a14="http://schemas.microsoft.com/office/drawing/2010/main">
+                <a:solidFill>
+                  <a:srgbClr val="FFFFFF"/>
+                </a:solidFill>
+              </a14:hiddenFill>
+            </a:ext>
+          </a:extLst>
+        </p:spPr>
+        <p:txBody>
+          <a:bodyPr wrap="none" anchor="ctr"/>
+          <a:lstStyle/>
+          <a:p>
+            <a:pPr algn="ctr"/>
+            <a:r>
+              <a:rPr lang="en-US" sz="2000" b="1" dirty="0" smtClean="0"/>
+              <a:t>z</a:t>
+            </a:r>
+          </a:p>
+          <a:p>
+            <a:pPr algn="ctr"/>
+            <a:r>
+              <a:rPr lang="en-US" sz="2000" b="1" dirty="0" smtClean="0"/>
+              <a:t>Holds green</a:t>
+            </a:r>
+          </a:p>
+          <a:p>
+            <a:pPr algn="ctr"/>
+            <a:r>
+              <a:rPr lang="en-US" sz="2000" b="1" dirty="0" smtClean="0"/>
+              <a:t>waiting for red</a:t>
+            </a:r>
+            <a:endParaRPr lang="en-US" sz="2000" b="1" dirty="0"/>
+          </a:p>
+          <a:p>
+            <a:pPr algn="ctr"/>
+            <a:endParaRPr lang="en-US" sz="2000" b="1" dirty="0"/>
+          </a:p>
+        </p:txBody>
+      </p:sp>
+      <p:sp>
+        <p:nvSpPr>
+          <p:cNvPr id="6" name="Oval 5"/>
+          <p:cNvSpPr>
+            <a:spLocks noChangeAspect="1"/>
+          </p:cNvSpPr>
+          <p:nvPr/>
+        </p:nvSpPr>
+        <p:spPr>
+          <a:xfrm>
+            <a:off x="4114800" y="5293895"/>
+            <a:ext cx="457200" cy="457200"/>
+          </a:xfrm>
+          <a:prstGeom prst="ellipse">
+            <a:avLst/>
+          </a:prstGeom>
+          <a:solidFill>
+            <a:srgbClr val="FF0000"/>
+          </a:solidFill>
+        </p:spPr>
+        <p:style>
+          <a:lnRef idx="1">
+            <a:schemeClr val="accent1"/>
+          </a:lnRef>
+          <a:fillRef idx="3">
+            <a:schemeClr val="accent1"/>
+          </a:fillRef>
+          <a:effectRef idx="2">
+            <a:schemeClr val="accent1"/>
+          </a:effectRef>
+          <a:fontRef idx="minor">
+            <a:schemeClr val="lt1"/>
+          </a:fontRef>
+        </p:style>
+        <p:txBody>
+          <a:bodyPr rtlCol="0" anchor="ctr"/>
+          <a:lstStyle/>
+          <a:p>
+            <a:pPr algn="ctr"/>
+            <a:endParaRPr lang="en-US"/>
+          </a:p>
+        </p:txBody>
+      </p:sp>
+      <p:sp>
+        <p:nvSpPr>
+          <p:cNvPr id="7" name="Oval 6"/>
+          <p:cNvSpPr>
+            <a:spLocks noChangeAspect="1"/>
+          </p:cNvSpPr>
+          <p:nvPr/>
+        </p:nvSpPr>
+        <p:spPr>
+          <a:xfrm>
+            <a:off x="7368674" y="3427663"/>
+            <a:ext cx="457200" cy="457200"/>
+          </a:xfrm>
+          <a:prstGeom prst="ellipse">
+            <a:avLst/>
+          </a:prstGeom>
+          <a:solidFill>
+            <a:srgbClr val="0000FF"/>
+          </a:solidFill>
+        </p:spPr>
+        <p:style>
+          <a:lnRef idx="1">
+            <a:schemeClr val="accent1"/>
+          </a:lnRef>
+          <a:fillRef idx="3">
+            <a:schemeClr val="accent1"/>
+          </a:fillRef>
+          <a:effectRef idx="2">
+            <a:schemeClr val="accent1"/>
+          </a:effectRef>
+          <a:fontRef idx="minor">
+            <a:schemeClr val="lt1"/>
+          </a:fontRef>
+        </p:style>
+        <p:txBody>
+          <a:bodyPr rtlCol="0" anchor="ctr"/>
+          <a:lstStyle/>
+          <a:p>
+            <a:pPr algn="ctr"/>
+            <a:endParaRPr lang="en-US"/>
+          </a:p>
+        </p:txBody>
+      </p:sp>
+      <p:sp>
+        <p:nvSpPr>
+          <p:cNvPr id="8" name="Oval 7"/>
+          <p:cNvSpPr>
+            <a:spLocks noChangeAspect="1"/>
+          </p:cNvSpPr>
+          <p:nvPr/>
+        </p:nvSpPr>
+        <p:spPr>
+          <a:xfrm>
+            <a:off x="4114800" y="1494589"/>
+            <a:ext cx="457200" cy="457200"/>
+          </a:xfrm>
+          <a:prstGeom prst="ellipse">
+            <a:avLst/>
+          </a:prstGeom>
+          <a:solidFill>
+            <a:srgbClr val="008000"/>
+          </a:solidFill>
+        </p:spPr>
+        <p:style>
+          <a:lnRef idx="1">
+            <a:schemeClr val="accent1"/>
+          </a:lnRef>
+          <a:fillRef idx="3">
+            <a:schemeClr val="accent1"/>
+          </a:fillRef>
+          <a:effectRef idx="2">
+            <a:schemeClr val="accent1"/>
+          </a:effectRef>
+          <a:fontRef idx="minor">
+            <a:schemeClr val="lt1"/>
+          </a:fontRef>
+        </p:style>
+        <p:txBody>
+          <a:bodyPr rtlCol="0" anchor="ctr"/>
+          <a:lstStyle/>
+          <a:p>
+            <a:pPr algn="ctr"/>
+            <a:endParaRPr lang="en-US"/>
+          </a:p>
+        </p:txBody>
+      </p:sp>
+      <p:cxnSp>
+        <p:nvCxnSpPr>
+          <p:cNvPr id="10" name="Straight Arrow Connector 9"/>
+          <p:cNvCxnSpPr>
+            <a:stCxn id="3" idx="7"/>
+          </p:cNvCxnSpPr>
+          <p:nvPr/>
+        </p:nvCxnSpPr>
+        <p:spPr>
+          <a:xfrm flipV="1">
+            <a:off x="4988641" y="4025232"/>
+            <a:ext cx="2380033" cy="267822"/>
+          </a:xfrm>
+          <a:prstGeom prst="straightConnector1">
+            <a:avLst/>
+          </a:prstGeom>
+          <a:ln>
+            <a:tailEnd type="arrow"/>
+          </a:ln>
+        </p:spPr>
+        <p:style>
+          <a:lnRef idx="2">
+            <a:schemeClr val="accent1"/>
+          </a:lnRef>
+          <a:fillRef idx="0">
+            <a:schemeClr val="accent1"/>
+          </a:fillRef>
+          <a:effectRef idx="1">
+            <a:schemeClr val="accent1"/>
+          </a:effectRef>
+          <a:fontRef idx="minor">
+            <a:schemeClr val="tx1"/>
+          </a:fontRef>
+        </p:style>
+      </p:cxnSp>
+      <p:cxnSp>
+        <p:nvCxnSpPr>
+          <p:cNvPr id="13" name="Straight Arrow Connector 12"/>
+          <p:cNvCxnSpPr>
+            <a:stCxn id="4" idx="1"/>
+            <a:endCxn id="5" idx="5"/>
+          </p:cNvCxnSpPr>
+          <p:nvPr/>
+        </p:nvCxnSpPr>
+        <p:spPr>
+          <a:xfrm flipH="1" flipV="1">
+            <a:off x="4988641" y="1797599"/>
+            <a:ext cx="1893875" cy="666655"/>
+          </a:xfrm>
+          <a:prstGeom prst="straightConnector1">
+            <a:avLst/>
+          </a:prstGeom>
+          <a:ln>
+            <a:tailEnd type="arrow"/>
+          </a:ln>
+        </p:spPr>
+        <p:style>
+          <a:lnRef idx="2">
+            <a:schemeClr val="accent1"/>
+          </a:lnRef>
+          <a:fillRef idx="0">
+            <a:schemeClr val="accent1"/>
+          </a:fillRef>
+          <a:effectRef idx="1">
+            <a:schemeClr val="accent1"/>
+          </a:effectRef>
+          <a:fontRef idx="minor">
+            <a:schemeClr val="tx1"/>
+          </a:fontRef>
+        </p:style>
+      </p:cxnSp>
+      <p:sp>
+        <p:nvSpPr>
+          <p:cNvPr id="15" name="TextBox 14"/>
+          <p:cNvSpPr txBox="1"/>
+          <p:nvPr/>
+        </p:nvSpPr>
+        <p:spPr>
+          <a:xfrm>
+            <a:off x="5256463" y="1445876"/>
+            <a:ext cx="3932537" cy="461665"/>
+          </a:xfrm>
+          <a:prstGeom prst="rect">
+            <a:avLst/>
+          </a:prstGeom>
+          <a:noFill/>
+        </p:spPr>
+        <p:txBody>
+          <a:bodyPr wrap="none" rtlCol="0">
+            <a:spAutoFit/>
+          </a:bodyPr>
+          <a:lstStyle/>
+          <a:p>
+            <a:r>
+              <a:rPr lang="en-US" sz="2400" b="1" dirty="0" smtClean="0"/>
+              <a:t>Marker message: Need green</a:t>
+            </a:r>
+            <a:endParaRPr lang="en-US" sz="2400" b="1" dirty="0"/>
+          </a:p>
+        </p:txBody>
+      </p:sp>
+      <p:sp>
+        <p:nvSpPr>
+          <p:cNvPr id="19" name="TextBox 18"/>
+          <p:cNvSpPr txBox="1"/>
+          <p:nvPr/>
+        </p:nvSpPr>
+        <p:spPr>
+          <a:xfrm>
+            <a:off x="5272695" y="4293054"/>
+            <a:ext cx="3763019" cy="461665"/>
+          </a:xfrm>
+          <a:prstGeom prst="rect">
+            <a:avLst/>
+          </a:prstGeom>
+          <a:noFill/>
+        </p:spPr>
+        <p:txBody>
+          <a:bodyPr wrap="none" rtlCol="0">
+            <a:spAutoFit/>
+          </a:bodyPr>
+          <a:lstStyle/>
+          <a:p>
+            <a:r>
+              <a:rPr lang="en-US" sz="2400" b="1" dirty="0" smtClean="0"/>
+              <a:t>Marker message: Need blue</a:t>
+            </a:r>
+            <a:endParaRPr lang="en-US" sz="2400" b="1" dirty="0"/>
+          </a:p>
+        </p:txBody>
+      </p:sp>
+      <p:cxnSp>
+        <p:nvCxnSpPr>
+          <p:cNvPr id="9" name="Straight Arrow Connector 8"/>
+          <p:cNvCxnSpPr>
+            <a:stCxn id="5" idx="4"/>
+            <a:endCxn id="3" idx="0"/>
+          </p:cNvCxnSpPr>
+          <p:nvPr/>
+        </p:nvCxnSpPr>
+        <p:spPr>
+          <a:xfrm>
+            <a:off x="4342063" y="2065421"/>
+            <a:ext cx="0" cy="1959811"/>
+          </a:xfrm>
+          <a:prstGeom prst="straightConnector1">
+            <a:avLst/>
+          </a:prstGeom>
+          <a:ln>
+            <a:tailEnd type="arrow"/>
+          </a:ln>
+        </p:spPr>
+        <p:style>
+          <a:lnRef idx="2">
+            <a:schemeClr val="accent1"/>
+          </a:lnRef>
+          <a:fillRef idx="0">
+            <a:schemeClr val="accent1"/>
+          </a:fillRef>
+          <a:effectRef idx="1">
+            <a:schemeClr val="accent1"/>
+          </a:effectRef>
+          <a:fontRef idx="minor">
+            <a:schemeClr val="tx1"/>
+          </a:fontRef>
+        </p:style>
+      </p:cxnSp>
+      <p:sp>
+        <p:nvSpPr>
+          <p:cNvPr id="16" name="TextBox 15"/>
+          <p:cNvSpPr txBox="1"/>
+          <p:nvPr/>
+        </p:nvSpPr>
+        <p:spPr>
+          <a:xfrm>
+            <a:off x="708471" y="2645033"/>
+            <a:ext cx="3631673" cy="461665"/>
+          </a:xfrm>
+          <a:prstGeom prst="rect">
+            <a:avLst/>
+          </a:prstGeom>
+          <a:noFill/>
+        </p:spPr>
+        <p:txBody>
+          <a:bodyPr wrap="none" rtlCol="0">
+            <a:spAutoFit/>
+          </a:bodyPr>
+          <a:lstStyle/>
+          <a:p>
+            <a:r>
+              <a:rPr lang="en-US" sz="2400" b="1" dirty="0" smtClean="0"/>
+              <a:t>Marker message: Need red</a:t>
+            </a:r>
+            <a:endParaRPr lang="en-US" sz="2400" b="1" dirty="0"/>
+          </a:p>
+        </p:txBody>
+      </p:sp>
+      <p:sp>
+        <p:nvSpPr>
+          <p:cNvPr id="17" name="TextBox 16"/>
+          <p:cNvSpPr txBox="1"/>
+          <p:nvPr/>
+        </p:nvSpPr>
+        <p:spPr>
+          <a:xfrm>
+            <a:off x="116055" y="6038562"/>
+            <a:ext cx="4811934" cy="584776"/>
+          </a:xfrm>
+          <a:prstGeom prst="rect">
+            <a:avLst/>
+          </a:prstGeom>
+          <a:solidFill>
+            <a:srgbClr val="FFFFFF"/>
+          </a:solidFill>
+        </p:spPr>
+        <p:txBody>
+          <a:bodyPr wrap="none" rtlCol="0">
+            <a:spAutoFit/>
+          </a:bodyPr>
+          <a:lstStyle/>
+          <a:p>
+            <a:r>
+              <a:rPr lang="en-US" sz="3200" b="1" dirty="0" smtClean="0"/>
+              <a:t>z sends markers: </a:t>
+            </a:r>
+            <a:r>
+              <a:rPr lang="en-US" sz="3200" b="1" smtClean="0"/>
+              <a:t>Need red!</a:t>
+            </a:r>
+            <a:endParaRPr lang="en-US" sz="3200" b="1" dirty="0"/>
+          </a:p>
+        </p:txBody>
+      </p:sp>
+    </p:spTree>
+    <p:extLst>
+      <p:ext uri="{BB962C8B-B14F-4D97-AF65-F5344CB8AC3E}">
+        <p14:creationId xmlns:p14="http://schemas.microsoft.com/office/powerpoint/2010/main" val="3086481999"/>
       </p:ext>
     </p:extLst>
   </p:cSld>

</xml_diff>